<commit_message>
better graph with correct titles along axes
</commit_message>
<xml_diff>
--- a/presentation.pptx
+++ b/presentation.pptx
@@ -10827,12 +10827,128 @@
           </a:p>
         </p:txBody>
       </p:sp>
+      <p:sp>
+        <p:nvSpPr>
+          <p:cNvPr id="44" name="Tijdelijke aanduiding voor inhoud 2">
+            <a:extLst>
+              <a:ext uri="{FF2B5EF4-FFF2-40B4-BE49-F238E27FC236}">
+                <a16:creationId xmlns:a16="http://schemas.microsoft.com/office/drawing/2014/main" id="{5080098B-FA06-4908-929F-16C515C3F572}"/>
+              </a:ext>
+            </a:extLst>
+          </p:cNvPr>
+          <p:cNvSpPr>
+            <a:spLocks noGrp="1"/>
+          </p:cNvSpPr>
+          <p:nvPr>
+            <p:ph idx="1"/>
+          </p:nvPr>
+        </p:nvSpPr>
+        <p:spPr>
+          <a:xfrm>
+            <a:off x="569471" y="1825625"/>
+            <a:ext cx="5257800" cy="4351338"/>
+          </a:xfrm>
+        </p:spPr>
+        <p:txBody>
+          <a:bodyPr>
+            <a:normAutofit/>
+          </a:bodyPr>
+          <a:lstStyle/>
+          <a:p>
+            <a:r>
+              <a:rPr lang="nl-NL" sz="2600" dirty="0"/>
+              <a:t>Reference </a:t>
+            </a:r>
+            <a:r>
+              <a:rPr lang="nl-NL" sz="2600" dirty="0" err="1"/>
+              <a:t>value</a:t>
+            </a:r>
+            <a:r>
+              <a:rPr lang="nl-NL" sz="2600" dirty="0"/>
+              <a:t>: </a:t>
+            </a:r>
+            <a:r>
+              <a:rPr lang="nl-NL" sz="2600" dirty="0" err="1"/>
+              <a:t>reasonable</a:t>
+            </a:r>
+            <a:r>
+              <a:rPr lang="nl-NL" sz="2600" dirty="0"/>
+              <a:t> </a:t>
+            </a:r>
+            <a:r>
+              <a:rPr lang="nl-NL" sz="2600" dirty="0" err="1"/>
+              <a:t>values</a:t>
+            </a:r>
+            <a:r>
+              <a:rPr lang="nl-NL" sz="2600" dirty="0"/>
+              <a:t> 300-5000 m</a:t>
+            </a:r>
+          </a:p>
+          <a:p>
+            <a:r>
+              <a:rPr lang="nl-NL" sz="2600" dirty="0"/>
+              <a:t>Smaller </a:t>
+            </a:r>
+            <a:r>
+              <a:rPr lang="nl-NL" sz="2600" dirty="0" err="1"/>
+              <a:t>clouds</a:t>
+            </a:r>
+            <a:r>
+              <a:rPr lang="nl-NL" sz="2600" dirty="0"/>
+              <a:t> have </a:t>
+            </a:r>
+            <a:r>
+              <a:rPr lang="nl-NL" sz="2600" dirty="0" err="1"/>
+              <a:t>relevance</a:t>
+            </a:r>
+            <a:r>
+              <a:rPr lang="nl-NL" sz="2600" dirty="0"/>
+              <a:t> </a:t>
+            </a:r>
+            <a:r>
+              <a:rPr lang="nl-NL" sz="2600" dirty="0" err="1"/>
+              <a:t>for</a:t>
+            </a:r>
+            <a:r>
+              <a:rPr lang="nl-NL" sz="2600" dirty="0"/>
+              <a:t> </a:t>
+            </a:r>
+            <a:r>
+              <a:rPr lang="nl-NL" sz="2600" dirty="0" err="1"/>
+              <a:t>environmental</a:t>
+            </a:r>
+            <a:r>
+              <a:rPr lang="nl-NL" sz="2600" dirty="0"/>
+              <a:t> </a:t>
+            </a:r>
+            <a:r>
+              <a:rPr lang="nl-NL" sz="2600" dirty="0" err="1"/>
+              <a:t>moisture</a:t>
+            </a:r>
+            <a:r>
+              <a:rPr lang="nl-NL" sz="2600" dirty="0"/>
+              <a:t> at </a:t>
+            </a:r>
+            <a:r>
+              <a:rPr lang="nl-NL" sz="2600" dirty="0" err="1"/>
+              <a:t>z</a:t>
+            </a:r>
+            <a:r>
+              <a:rPr lang="nl-NL" sz="2600" dirty="0"/>
+              <a:t> = 2.5-3 km</a:t>
+            </a:r>
+          </a:p>
+          <a:p>
+            <a:endParaRPr lang="nl-NL" dirty="0"/>
+          </a:p>
+        </p:txBody>
+      </p:sp>
       <p:pic>
         <p:nvPicPr>
-          <p:cNvPr id="43" name="Afbeelding 3">
-            <a:extLst>
-              <a:ext uri="{FF2B5EF4-FFF2-40B4-BE49-F238E27FC236}">
-                <a16:creationId xmlns:a16="http://schemas.microsoft.com/office/drawing/2014/main" id="{5306231B-5461-4CDF-A1A6-0E530C09FBBB}"/>
+          <p:cNvPr id="3" name="Afbeelding 2">
+            <a:extLst>
+              <a:ext uri="{FF2B5EF4-FFF2-40B4-BE49-F238E27FC236}">
+                <a16:creationId xmlns:a16="http://schemas.microsoft.com/office/drawing/2014/main" id="{923D5315-8C6F-4F0F-8150-6A706A94E72A}"/>
               </a:ext>
             </a:extLst>
           </p:cNvPr>
@@ -10849,130 +10965,14 @@
         </p:blipFill>
         <p:spPr>
           <a:xfrm>
-            <a:off x="5989547" y="1825625"/>
-            <a:ext cx="6040177" cy="4036864"/>
+            <a:off x="5827742" y="1653988"/>
+            <a:ext cx="6296989" cy="4208501"/>
           </a:xfrm>
           <a:prstGeom prst="rect">
             <a:avLst/>
           </a:prstGeom>
         </p:spPr>
       </p:pic>
-      <p:sp>
-        <p:nvSpPr>
-          <p:cNvPr id="44" name="Tijdelijke aanduiding voor inhoud 2">
-            <a:extLst>
-              <a:ext uri="{FF2B5EF4-FFF2-40B4-BE49-F238E27FC236}">
-                <a16:creationId xmlns:a16="http://schemas.microsoft.com/office/drawing/2014/main" id="{5080098B-FA06-4908-929F-16C515C3F572}"/>
-              </a:ext>
-            </a:extLst>
-          </p:cNvPr>
-          <p:cNvSpPr>
-            <a:spLocks noGrp="1"/>
-          </p:cNvSpPr>
-          <p:nvPr>
-            <p:ph idx="1"/>
-          </p:nvPr>
-        </p:nvSpPr>
-        <p:spPr>
-          <a:xfrm>
-            <a:off x="569471" y="1825625"/>
-            <a:ext cx="5257800" cy="4351338"/>
-          </a:xfrm>
-        </p:spPr>
-        <p:txBody>
-          <a:bodyPr>
-            <a:normAutofit/>
-          </a:bodyPr>
-          <a:lstStyle/>
-          <a:p>
-            <a:r>
-              <a:rPr lang="nl-NL" sz="2600" dirty="0"/>
-              <a:t>Reference </a:t>
-            </a:r>
-            <a:r>
-              <a:rPr lang="nl-NL" sz="2600" dirty="0" err="1"/>
-              <a:t>value</a:t>
-            </a:r>
-            <a:r>
-              <a:rPr lang="nl-NL" sz="2600" dirty="0"/>
-              <a:t>: </a:t>
-            </a:r>
-            <a:r>
-              <a:rPr lang="nl-NL" sz="2600" dirty="0" err="1"/>
-              <a:t>reasonable</a:t>
-            </a:r>
-            <a:r>
-              <a:rPr lang="nl-NL" sz="2600" dirty="0"/>
-              <a:t> </a:t>
-            </a:r>
-            <a:r>
-              <a:rPr lang="nl-NL" sz="2600" dirty="0" err="1"/>
-              <a:t>values</a:t>
-            </a:r>
-            <a:r>
-              <a:rPr lang="nl-NL" sz="2600" dirty="0"/>
-              <a:t> 300-5000 m</a:t>
-            </a:r>
-          </a:p>
-          <a:p>
-            <a:r>
-              <a:rPr lang="nl-NL" sz="2600" dirty="0"/>
-              <a:t>Smaller </a:t>
-            </a:r>
-            <a:r>
-              <a:rPr lang="nl-NL" sz="2600" dirty="0" err="1"/>
-              <a:t>clouds</a:t>
-            </a:r>
-            <a:r>
-              <a:rPr lang="nl-NL" sz="2600" dirty="0"/>
-              <a:t> have </a:t>
-            </a:r>
-            <a:r>
-              <a:rPr lang="nl-NL" sz="2600" dirty="0" err="1"/>
-              <a:t>relevance</a:t>
-            </a:r>
-            <a:r>
-              <a:rPr lang="nl-NL" sz="2600" dirty="0"/>
-              <a:t> </a:t>
-            </a:r>
-            <a:r>
-              <a:rPr lang="nl-NL" sz="2600" dirty="0" err="1"/>
-              <a:t>for</a:t>
-            </a:r>
-            <a:r>
-              <a:rPr lang="nl-NL" sz="2600" dirty="0"/>
-              <a:t> </a:t>
-            </a:r>
-            <a:r>
-              <a:rPr lang="nl-NL" sz="2600" dirty="0" err="1"/>
-              <a:t>environmental</a:t>
-            </a:r>
-            <a:r>
-              <a:rPr lang="nl-NL" sz="2600" dirty="0"/>
-              <a:t> </a:t>
-            </a:r>
-            <a:r>
-              <a:rPr lang="nl-NL" sz="2600" dirty="0" err="1"/>
-              <a:t>moisture</a:t>
-            </a:r>
-            <a:r>
-              <a:rPr lang="nl-NL" sz="2600" dirty="0"/>
-              <a:t> at </a:t>
-            </a:r>
-            <a:r>
-              <a:rPr lang="nl-NL" sz="2600" dirty="0" err="1"/>
-              <a:t>z</a:t>
-            </a:r>
-            <a:r>
-              <a:rPr lang="nl-NL" sz="2600" dirty="0"/>
-              <a:t> = 2.5-3 km</a:t>
-            </a:r>
-          </a:p>
-          <a:p>
-            <a:endParaRPr lang="nl-NL" dirty="0"/>
-          </a:p>
-        </p:txBody>
-      </p:sp>
     </p:spTree>
     <p:extLst>
       <p:ext uri="{BB962C8B-B14F-4D97-AF65-F5344CB8AC3E}">

</xml_diff>